<commit_message>
day 69 and 70
</commit_message>
<xml_diff>
--- a/_PowerPoints/2nd Semester/Unit 10 Rational Exponents (from Algebra 4)/PreCalc_Day_068 Functions and Inverses (Alg 4 Ch 6.6 and 6.7).pptx
+++ b/_PowerPoints/2nd Semester/Unit 10 Rational Exponents (from Algebra 4)/PreCalc_Day_068 Functions and Inverses (Alg 4 Ch 6.6 and 6.7).pptx
@@ -213,7 +213,7 @@
           <a:p>
             <a:fld id="{FAC4242D-6570-4D26-878C-5DE8AD62D39F}" type="datetimeFigureOut">
               <a:rPr lang="en-US" smtClean="0"/>
-              <a:t>4/5/2018</a:t>
+              <a:t>4/9/2018</a:t>
             </a:fld>
             <a:endParaRPr lang="en-US"/>
           </a:p>
@@ -466,7 +466,7 @@
             <a:fld id="{87DE6118-2437-4B30-8E3C-4D2BE6020583}" type="datetimeFigureOut">
               <a:rPr lang="en-US" dirty="0"/>
               <a:pPr/>
-              <a:t>4/5/2018</a:t>
+              <a:t>4/9/2018</a:t>
             </a:fld>
             <a:endParaRPr lang="en-US" dirty="0"/>
           </a:p>
@@ -792,7 +792,7 @@
           <a:p>
             <a:fld id="{87DE6118-2437-4B30-8E3C-4D2BE6020583}" type="datetimeFigureOut">
               <a:rPr lang="en-US" dirty="0"/>
-              <a:t>4/5/2018</a:t>
+              <a:t>4/9/2018</a:t>
             </a:fld>
             <a:endParaRPr lang="en-US" dirty="0"/>
           </a:p>
@@ -967,7 +967,7 @@
           <a:p>
             <a:fld id="{87DE6118-2437-4B30-8E3C-4D2BE6020583}" type="datetimeFigureOut">
               <a:rPr lang="en-US" dirty="0"/>
-              <a:t>4/5/2018</a:t>
+              <a:t>4/9/2018</a:t>
             </a:fld>
             <a:endParaRPr lang="en-US" dirty="0"/>
           </a:p>
@@ -1132,7 +1132,7 @@
           <a:p>
             <a:fld id="{87DE6118-2437-4B30-8E3C-4D2BE6020583}" type="datetimeFigureOut">
               <a:rPr lang="en-US" dirty="0"/>
-              <a:t>4/5/2018</a:t>
+              <a:t>4/9/2018</a:t>
             </a:fld>
             <a:endParaRPr lang="en-US" dirty="0"/>
           </a:p>
@@ -1405,7 +1405,7 @@
             <a:fld id="{87DE6118-2437-4B30-8E3C-4D2BE6020583}" type="datetimeFigureOut">
               <a:rPr lang="en-US" dirty="0"/>
               <a:pPr/>
-              <a:t>4/5/2018</a:t>
+              <a:t>4/9/2018</a:t>
             </a:fld>
             <a:endParaRPr lang="en-US" dirty="0"/>
           </a:p>
@@ -1795,7 +1795,7 @@
           <a:p>
             <a:fld id="{87DE6118-2437-4B30-8E3C-4D2BE6020583}" type="datetimeFigureOut">
               <a:rPr lang="en-US" dirty="0"/>
-              <a:t>4/5/2018</a:t>
+              <a:t>4/9/2018</a:t>
             </a:fld>
             <a:endParaRPr lang="en-US" dirty="0"/>
           </a:p>
@@ -2267,7 +2267,7 @@
           <a:p>
             <a:fld id="{87DE6118-2437-4B30-8E3C-4D2BE6020583}" type="datetimeFigureOut">
               <a:rPr lang="en-US" dirty="0"/>
-              <a:t>4/5/2018</a:t>
+              <a:t>4/9/2018</a:t>
             </a:fld>
             <a:endParaRPr lang="en-US" dirty="0"/>
           </a:p>
@@ -2380,7 +2380,7 @@
           <a:p>
             <a:fld id="{87DE6118-2437-4B30-8E3C-4D2BE6020583}" type="datetimeFigureOut">
               <a:rPr lang="en-US" dirty="0"/>
-              <a:t>4/5/2018</a:t>
+              <a:t>4/9/2018</a:t>
             </a:fld>
             <a:endParaRPr lang="en-US" dirty="0"/>
           </a:p>
@@ -2470,7 +2470,7 @@
           <a:p>
             <a:fld id="{87DE6118-2437-4B30-8E3C-4D2BE6020583}" type="datetimeFigureOut">
               <a:rPr lang="en-US" dirty="0"/>
-              <a:t>4/5/2018</a:t>
+              <a:t>4/9/2018</a:t>
             </a:fld>
             <a:endParaRPr lang="en-US" dirty="0"/>
           </a:p>
@@ -2812,7 +2812,7 @@
             <a:fld id="{87DE6118-2437-4B30-8E3C-4D2BE6020583}" type="datetimeFigureOut">
               <a:rPr lang="en-US" dirty="0"/>
               <a:pPr/>
-              <a:t>4/5/2018</a:t>
+              <a:t>4/9/2018</a:t>
             </a:fld>
             <a:endParaRPr lang="en-US" dirty="0"/>
           </a:p>
@@ -3197,7 +3197,7 @@
             <a:fld id="{87DE6118-2437-4B30-8E3C-4D2BE6020583}" type="datetimeFigureOut">
               <a:rPr lang="en-US" dirty="0"/>
               <a:pPr/>
-              <a:t>4/5/2018</a:t>
+              <a:t>4/9/2018</a:t>
             </a:fld>
             <a:endParaRPr lang="en-US" dirty="0"/>
           </a:p>
@@ -3472,7 +3472,7 @@
             <a:fld id="{87DE6118-2437-4B30-8E3C-4D2BE6020583}" type="datetimeFigureOut">
               <a:rPr lang="en-US" dirty="0"/>
               <a:pPr/>
-              <a:t>4/5/2018</a:t>
+              <a:t>4/9/2018</a:t>
             </a:fld>
             <a:endParaRPr lang="en-US" dirty="0"/>
           </a:p>
@@ -4275,6 +4275,13 @@
   <p:clrMapOvr>
     <a:masterClrMapping/>
   </p:clrMapOvr>
+  <p:timing>
+    <p:tnLst>
+      <p:par>
+        <p:cTn id="1" dur="indefinite" restart="never" nodeType="tmRoot"/>
+      </p:par>
+    </p:tnLst>
+  </p:timing>
 </p:sld>
 </file>
 
@@ -4393,6 +4400,13 @@
   <p:clrMapOvr>
     <a:masterClrMapping/>
   </p:clrMapOvr>
+  <p:timing>
+    <p:tnLst>
+      <p:par>
+        <p:cTn id="1" dur="indefinite" restart="never" nodeType="tmRoot"/>
+      </p:par>
+    </p:tnLst>
+  </p:timing>
 </p:sld>
 </file>
 
@@ -4546,6 +4560,13 @@
   <p:clrMapOvr>
     <a:masterClrMapping/>
   </p:clrMapOvr>
+  <p:timing>
+    <p:tnLst>
+      <p:par>
+        <p:cTn id="1" dur="indefinite" restart="never" nodeType="tmRoot"/>
+      </p:par>
+    </p:tnLst>
+  </p:timing>
 </p:sld>
 </file>
 
@@ -4605,7 +4626,6 @@
               <a:rPr lang="en-US" dirty="0"/>
               <a:t>y = 2x – 4 </a:t>
             </a:r>
-            <a:endParaRPr lang="en-US" dirty="0"/>
           </a:p>
         </p:txBody>
       </p:sp>
@@ -4619,6 +4639,13 @@
   <p:clrMapOvr>
     <a:masterClrMapping/>
   </p:clrMapOvr>
+  <p:timing>
+    <p:tnLst>
+      <p:par>
+        <p:cTn id="1" dur="indefinite" restart="never" nodeType="tmRoot"/>
+      </p:par>
+    </p:tnLst>
+  </p:timing>
 </p:sld>
 </file>
 
@@ -4762,6 +4789,13 @@
   <p:clrMapOvr>
     <a:masterClrMapping/>
   </p:clrMapOvr>
+  <p:timing>
+    <p:tnLst>
+      <p:par>
+        <p:cTn id="1" dur="indefinite" restart="never" nodeType="tmRoot"/>
+      </p:par>
+    </p:tnLst>
+  </p:timing>
 </p:sld>
 </file>
 
@@ -4876,6 +4910,13 @@
   <p:clrMapOvr>
     <a:masterClrMapping/>
   </p:clrMapOvr>
+  <p:timing>
+    <p:tnLst>
+      <p:par>
+        <p:cTn id="1" dur="indefinite" restart="never" nodeType="tmRoot"/>
+      </p:par>
+    </p:tnLst>
+  </p:timing>
 </p:sld>
 </file>
 
@@ -5143,7 +5184,7 @@
           <a:graphicData uri="http://schemas.openxmlformats.org/presentationml/2006/ole">
             <mc:AlternateContent xmlns:mc="http://schemas.openxmlformats.org/markup-compatibility/2006">
               <mc:Choice xmlns:v="urn:schemas-microsoft-com:vml" Requires="v">
-                <p:oleObj spid="_x0000_s7173" r:id="rId3" imgW="889000" imgH="393700" progId="Equation.DSMT4">
+                <p:oleObj spid="_x0000_s7176" r:id="rId3" imgW="889000" imgH="393700" progId="Equation.DSMT4">
                   <p:embed/>
                 </p:oleObj>
               </mc:Choice>
@@ -5198,6 +5239,13 @@
   <p:clrMapOvr>
     <a:masterClrMapping/>
   </p:clrMapOvr>
+  <p:timing>
+    <p:tnLst>
+      <p:par>
+        <p:cTn id="1" dur="indefinite" restart="never" nodeType="tmRoot"/>
+      </p:par>
+    </p:tnLst>
+  </p:timing>
 </p:sld>
 </file>
 
@@ -5312,6 +5360,13 @@
   <p:clrMapOvr>
     <a:masterClrMapping/>
   </p:clrMapOvr>
+  <p:timing>
+    <p:tnLst>
+      <p:par>
+        <p:cTn id="1" dur="indefinite" restart="never" nodeType="tmRoot"/>
+      </p:par>
+    </p:tnLst>
+  </p:timing>
 </p:sld>
 </file>
 
@@ -5349,7 +5404,7 @@
           <a:p>
             <a:r>
               <a:rPr lang="en-US" dirty="0" smtClean="0"/>
-              <a:t>For Next Time</a:t>
+              <a:t>Bell Work</a:t>
             </a:r>
             <a:endParaRPr lang="en-US" dirty="0"/>
           </a:p>
@@ -5369,6 +5424,27 @@
         <p:txBody>
           <a:bodyPr/>
           <a:lstStyle/>
+          <a:p>
+            <a:pPr marL="0" indent="0">
+              <a:buNone/>
+            </a:pPr>
+            <a:endParaRPr lang="en-US" sz="4000" b="1" dirty="0" smtClean="0"/>
+          </a:p>
+          <a:p>
+            <a:pPr marL="0" indent="0">
+              <a:buNone/>
+            </a:pPr>
+            <a:r>
+              <a:rPr lang="en-US" sz="4000" b="1" dirty="0" smtClean="0"/>
+              <a:t>From Last Time: </a:t>
+            </a:r>
+          </a:p>
+          <a:p>
+            <a:pPr marL="0" indent="0">
+              <a:buNone/>
+            </a:pPr>
+            <a:endParaRPr lang="en-US" sz="4000" b="1" dirty="0"/>
+          </a:p>
           <a:p>
             <a:pPr marL="0" indent="0">
               <a:buNone/>
@@ -5401,6 +5477,13 @@
   <p:clrMapOvr>
     <a:masterClrMapping/>
   </p:clrMapOvr>
+  <p:timing>
+    <p:tnLst>
+      <p:par>
+        <p:cTn id="1" dur="indefinite" restart="never" nodeType="tmRoot"/>
+      </p:par>
+    </p:tnLst>
+  </p:timing>
 </p:sld>
 </file>
 
@@ -5576,7 +5659,7 @@
                 <p:ph idx="1"/>
                 <p:extLst>
                   <p:ext uri="{D42A27DB-BD31-4B8C-83A1-F6EECF244321}">
-                    <p14:modId xmlns:p14="http://schemas.microsoft.com/office/powerpoint/2010/main" val="3025471891"/>
+                    <p14:modId xmlns:p14="http://schemas.microsoft.com/office/powerpoint/2010/main" val="4114596936"/>
                   </p:ext>
                 </p:extLst>
               </p:nvPr>
@@ -5616,7 +5699,7 @@
                           <a:r>
                             <a:rPr lang="en-US" sz="3000" dirty="0">
                               <a:solidFill>
-                                <a:schemeClr val="tx1"/>
+                                <a:schemeClr val="bg1"/>
                               </a:solidFill>
                               <a:effectLst/>
                             </a:rPr>
@@ -5624,44 +5707,7 @@
                           </a:r>
                           <a:endParaRPr lang="en-US" sz="3000" dirty="0">
                             <a:solidFill>
-                              <a:schemeClr val="tx1"/>
-                            </a:solidFill>
-                            <a:effectLst/>
-                            <a:latin typeface="Times New Roman" panose="02020603050405020304" pitchFamily="18" charset="0"/>
-                            <a:ea typeface="Times New Roman" panose="02020603050405020304" pitchFamily="18" charset="0"/>
-                          </a:endParaRPr>
-                        </a:p>
-                      </a:txBody>
-                      <a:tcPr marL="68580" marR="68580" marT="0" marB="0"/>
-                    </a:tc>
-                    <a:tc>
-                      <a:txBody>
-                        <a:bodyPr/>
-                        <a:lstStyle/>
-                        <a:p>
-                          <a:pPr marL="0" marR="0">
-                            <a:lnSpc>
-                              <a:spcPct val="115000"/>
-                            </a:lnSpc>
-                            <a:spcBef>
-                              <a:spcPts val="0"/>
-                            </a:spcBef>
-                            <a:spcAft>
-                              <a:spcPts val="0"/>
-                            </a:spcAft>
-                          </a:pPr>
-                          <a:r>
-                            <a:rPr lang="en-US" sz="3000">
-                              <a:solidFill>
-                                <a:schemeClr val="tx1"/>
-                              </a:solidFill>
-                              <a:effectLst/>
-                            </a:rPr>
-                            <a:t>Definition</a:t>
-                          </a:r>
-                          <a:endParaRPr lang="en-US" sz="3000">
-                            <a:solidFill>
-                              <a:schemeClr val="tx1"/>
+                              <a:schemeClr val="bg1"/>
                             </a:solidFill>
                             <a:effectLst/>
                             <a:latin typeface="Times New Roman" panose="02020603050405020304" pitchFamily="18" charset="0"/>
@@ -5690,7 +5736,46 @@
                           <a:r>
                             <a:rPr lang="en-US" sz="3000" dirty="0">
                               <a:solidFill>
-                                <a:schemeClr val="tx1"/>
+                                <a:schemeClr val="bg1"/>
+                              </a:solidFill>
+                              <a:effectLst/>
+                            </a:rPr>
+                            <a:t>Definition</a:t>
+                          </a:r>
+                          <a:endParaRPr lang="en-US" sz="3000" dirty="0">
+                            <a:solidFill>
+                              <a:schemeClr val="bg1"/>
+                            </a:solidFill>
+                            <a:effectLst/>
+                            <a:latin typeface="Times New Roman" panose="02020603050405020304" pitchFamily="18" charset="0"/>
+                            <a:ea typeface="Times New Roman" panose="02020603050405020304" pitchFamily="18" charset="0"/>
+                          </a:endParaRPr>
+                        </a:p>
+                      </a:txBody>
+                      <a:tcPr marL="68580" marR="68580" marT="0" marB="0"/>
+                    </a:tc>
+                    <a:tc>
+                      <a:txBody>
+                        <a:bodyPr/>
+                        <a:lstStyle/>
+                        <a:p>
+                          <a:pPr marL="0" marR="0">
+                            <a:lnSpc>
+                              <a:spcPct val="115000"/>
+                            </a:lnSpc>
+                            <a:spcBef>
+                              <a:spcPts val="0"/>
+                            </a:spcBef>
+                            <a:spcAft>
+                              <a:spcPts val="0"/>
+                            </a:spcAft>
+                          </a:pPr>
+                          <a:r>
+                            <a:rPr lang="en-US" sz="3000" dirty="0">
+                              <a:solidFill>
+                                <a:schemeClr val="bg1">
+                                  <a:lumMod val="95000"/>
+                                </a:schemeClr>
                               </a:solidFill>
                               <a:effectLst/>
                             </a:rPr>
@@ -5698,7 +5783,9 @@
                           </a:r>
                           <a:endParaRPr lang="en-US" sz="3000" dirty="0" smtClean="0">
                             <a:solidFill>
-                              <a:schemeClr val="tx1"/>
+                              <a:schemeClr val="bg1">
+                                <a:lumMod val="95000"/>
+                              </a:schemeClr>
                             </a:solidFill>
                             <a:effectLst/>
                           </a:endParaRPr>
@@ -5718,7 +5805,9 @@
                           <a:r>
                             <a:rPr lang="en-US" sz="3000" dirty="0" smtClean="0">
                               <a:solidFill>
-                                <a:schemeClr val="tx1"/>
+                                <a:schemeClr val="bg1">
+                                  <a:lumMod val="95000"/>
+                                </a:schemeClr>
                               </a:solidFill>
                               <a:effectLst/>
                             </a:rPr>
@@ -5727,7 +5816,9 @@
                           <a:r>
                             <a:rPr lang="en-US" sz="3000" dirty="0">
                               <a:solidFill>
-                                <a:schemeClr val="tx1"/>
+                                <a:schemeClr val="bg1">
+                                  <a:lumMod val="95000"/>
+                                </a:schemeClr>
                               </a:solidFill>
                               <a:effectLst/>
                             </a:rPr>
@@ -5735,7 +5826,9 @@
                           </a:r>
                           <a:endParaRPr lang="en-US" sz="3000" dirty="0">
                             <a:solidFill>
-                              <a:schemeClr val="tx1"/>
+                              <a:schemeClr val="bg1">
+                                <a:lumMod val="95000"/>
+                              </a:schemeClr>
                             </a:solidFill>
                             <a:effectLst/>
                             <a:latin typeface="Times New Roman" panose="02020603050405020304" pitchFamily="18" charset="0"/>
@@ -5766,7 +5859,7 @@
                           <a:r>
                             <a:rPr lang="en-US" sz="3000" u="sng" dirty="0">
                               <a:solidFill>
-                                <a:schemeClr val="tx1"/>
+                                <a:schemeClr val="bg1"/>
                               </a:solidFill>
                               <a:effectLst/>
                             </a:rPr>
@@ -5774,7 +5867,7 @@
                           </a:r>
                           <a:endParaRPr lang="en-US" sz="3000" dirty="0">
                             <a:solidFill>
-                              <a:schemeClr val="tx1"/>
+                              <a:schemeClr val="bg1"/>
                             </a:solidFill>
                             <a:effectLst/>
                             <a:latin typeface="Times New Roman" panose="02020603050405020304" pitchFamily="18" charset="0"/>
@@ -5809,39 +5902,43 @@
                                 <m:d>
                                   <m:dPr>
                                     <m:ctrlPr>
-                                      <a:rPr lang="en-US" sz="3000" smtClean="0">
+                                      <a:rPr lang="en-US" sz="3000" i="1" baseline="0" smtClean="0">
                                         <a:solidFill>
                                           <a:schemeClr val="tx1"/>
                                         </a:solidFill>
                                         <a:effectLst/>
+                                        <a:latin typeface="Cambria Math" panose="02040503050406030204" pitchFamily="18" charset="0"/>
                                       </a:rPr>
                                     </m:ctrlPr>
                                   </m:dPr>
                                   <m:e>
                                     <m:r>
-                                      <a:rPr lang="en-US" sz="3000">
+                                      <a:rPr lang="en-US" sz="3000" baseline="0">
                                         <a:solidFill>
                                           <a:schemeClr val="tx1"/>
                                         </a:solidFill>
                                         <a:effectLst/>
+                                        <a:latin typeface="Cambria Math" panose="02040503050406030204" pitchFamily="18" charset="0"/>
                                       </a:rPr>
                                       <m:t>𝑓</m:t>
                                     </m:r>
                                     <m:r>
-                                      <a:rPr lang="en-US" sz="3000">
+                                      <a:rPr lang="en-US" sz="3000" baseline="0">
                                         <a:solidFill>
                                           <a:schemeClr val="tx1"/>
                                         </a:solidFill>
                                         <a:effectLst/>
+                                        <a:latin typeface="Cambria Math" panose="02040503050406030204" pitchFamily="18" charset="0"/>
                                       </a:rPr>
                                       <m:t>+</m:t>
                                     </m:r>
                                     <m:r>
-                                      <a:rPr lang="en-US" sz="3000">
+                                      <a:rPr lang="en-US" sz="3000" baseline="0">
                                         <a:solidFill>
                                           <a:schemeClr val="tx1"/>
                                         </a:solidFill>
                                         <a:effectLst/>
+                                        <a:latin typeface="Cambria Math" panose="02040503050406030204" pitchFamily="18" charset="0"/>
                                       </a:rPr>
                                       <m:t>𝑔</m:t>
                                     </m:r>
@@ -5850,116 +5947,127 @@
                                 <m:d>
                                   <m:dPr>
                                     <m:ctrlPr>
-                                      <a:rPr lang="en-US" sz="3000">
+                                      <a:rPr lang="en-US" sz="3000" i="1" baseline="0">
                                         <a:solidFill>
                                           <a:schemeClr val="tx1"/>
                                         </a:solidFill>
                                         <a:effectLst/>
+                                        <a:latin typeface="Cambria Math" panose="02040503050406030204" pitchFamily="18" charset="0"/>
                                       </a:rPr>
                                     </m:ctrlPr>
                                   </m:dPr>
                                   <m:e>
                                     <m:r>
-                                      <a:rPr lang="en-US" sz="3000">
+                                      <a:rPr lang="en-US" sz="3000" baseline="0">
                                         <a:solidFill>
                                           <a:schemeClr val="tx1"/>
                                         </a:solidFill>
                                         <a:effectLst/>
+                                        <a:latin typeface="Cambria Math" panose="02040503050406030204" pitchFamily="18" charset="0"/>
                                       </a:rPr>
                                       <m:t>𝑥</m:t>
                                     </m:r>
                                   </m:e>
                                 </m:d>
                                 <m:r>
-                                  <a:rPr lang="en-US" sz="3000">
+                                  <a:rPr lang="en-US" sz="3000" baseline="0">
                                     <a:solidFill>
                                       <a:schemeClr val="tx1"/>
                                     </a:solidFill>
                                     <a:effectLst/>
+                                    <a:latin typeface="Cambria Math" panose="02040503050406030204" pitchFamily="18" charset="0"/>
                                   </a:rPr>
                                   <m:t>= </m:t>
                                 </m:r>
                                 <m:r>
-                                  <a:rPr lang="en-US" sz="3000">
+                                  <a:rPr lang="en-US" sz="3000" baseline="0">
                                     <a:solidFill>
                                       <a:schemeClr val="tx1"/>
                                     </a:solidFill>
                                     <a:effectLst/>
+                                    <a:latin typeface="Cambria Math" panose="02040503050406030204" pitchFamily="18" charset="0"/>
                                   </a:rPr>
                                   <m:t>𝑓</m:t>
                                 </m:r>
                                 <m:d>
                                   <m:dPr>
                                     <m:ctrlPr>
-                                      <a:rPr lang="en-US" sz="3000">
+                                      <a:rPr lang="en-US" sz="3000" i="1" baseline="0">
                                         <a:solidFill>
                                           <a:schemeClr val="tx1"/>
                                         </a:solidFill>
                                         <a:effectLst/>
+                                        <a:latin typeface="Cambria Math" panose="02040503050406030204" pitchFamily="18" charset="0"/>
                                       </a:rPr>
                                     </m:ctrlPr>
                                   </m:dPr>
                                   <m:e>
                                     <m:r>
-                                      <a:rPr lang="en-US" sz="3000">
+                                      <a:rPr lang="en-US" sz="3000" baseline="0">
                                         <a:solidFill>
                                           <a:schemeClr val="tx1"/>
                                         </a:solidFill>
                                         <a:effectLst/>
+                                        <a:latin typeface="Cambria Math" panose="02040503050406030204" pitchFamily="18" charset="0"/>
                                       </a:rPr>
                                       <m:t>𝑥</m:t>
                                     </m:r>
                                   </m:e>
                                 </m:d>
                                 <m:r>
-                                  <a:rPr lang="en-US" sz="3000">
+                                  <a:rPr lang="en-US" sz="3000" baseline="0">
                                     <a:solidFill>
                                       <a:schemeClr val="tx1"/>
                                     </a:solidFill>
                                     <a:effectLst/>
+                                    <a:latin typeface="Cambria Math" panose="02040503050406030204" pitchFamily="18" charset="0"/>
                                   </a:rPr>
                                   <m:t>+ </m:t>
                                 </m:r>
                                 <m:r>
-                                  <a:rPr lang="en-US" sz="3000">
+                                  <a:rPr lang="en-US" sz="3000" baseline="0">
                                     <a:solidFill>
                                       <a:schemeClr val="tx1"/>
                                     </a:solidFill>
                                     <a:effectLst/>
+                                    <a:latin typeface="Cambria Math" panose="02040503050406030204" pitchFamily="18" charset="0"/>
                                   </a:rPr>
                                   <m:t>𝑔</m:t>
                                 </m:r>
                                 <m:r>
-                                  <a:rPr lang="en-US" sz="3000">
+                                  <a:rPr lang="en-US" sz="3000" baseline="0">
                                     <a:solidFill>
                                       <a:schemeClr val="tx1"/>
                                     </a:solidFill>
                                     <a:effectLst/>
+                                    <a:latin typeface="Cambria Math" panose="02040503050406030204" pitchFamily="18" charset="0"/>
                                   </a:rPr>
                                   <m:t>(</m:t>
                                 </m:r>
                                 <m:r>
-                                  <a:rPr lang="en-US" sz="3000">
+                                  <a:rPr lang="en-US" sz="3000" baseline="0">
                                     <a:solidFill>
                                       <a:schemeClr val="tx1"/>
                                     </a:solidFill>
                                     <a:effectLst/>
+                                    <a:latin typeface="Cambria Math" panose="02040503050406030204" pitchFamily="18" charset="0"/>
                                   </a:rPr>
                                   <m:t>𝑥</m:t>
                                 </m:r>
                                 <m:r>
-                                  <a:rPr lang="en-US" sz="3000">
+                                  <a:rPr lang="en-US" sz="3000" baseline="0">
                                     <a:solidFill>
                                       <a:schemeClr val="tx1"/>
                                     </a:solidFill>
                                     <a:effectLst/>
+                                    <a:latin typeface="Cambria Math" panose="02040503050406030204" pitchFamily="18" charset="0"/>
                                   </a:rPr>
                                   <m:t>)</m:t>
                                 </m:r>
                               </m:oMath>
                             </m:oMathPara>
                           </a14:m>
-                          <a:endParaRPr lang="en-US" sz="3000" dirty="0">
+                          <a:endParaRPr lang="en-US" sz="3000" baseline="0" dirty="0">
                             <a:solidFill>
                               <a:schemeClr val="tx1"/>
                             </a:solidFill>
@@ -5990,7 +6098,9 @@
                           <a:r>
                             <a:rPr lang="en-US" sz="3000">
                               <a:solidFill>
-                                <a:schemeClr val="tx1"/>
+                                <a:schemeClr val="bg1">
+                                  <a:lumMod val="95000"/>
+                                </a:schemeClr>
                               </a:solidFill>
                               <a:effectLst/>
                             </a:rPr>
@@ -5998,7 +6108,9 @@
                           </a:r>
                           <a:endParaRPr lang="en-US" sz="3000">
                             <a:solidFill>
-                              <a:schemeClr val="tx1"/>
+                              <a:schemeClr val="bg1">
+                                <a:lumMod val="95000"/>
+                              </a:schemeClr>
                             </a:solidFill>
                             <a:effectLst/>
                             <a:latin typeface="Times New Roman" panose="02020603050405020304" pitchFamily="18" charset="0"/>
@@ -6027,17 +6139,17 @@
                             </a:spcAft>
                           </a:pPr>
                           <a:r>
-                            <a:rPr lang="en-US" sz="3000" u="sng">
+                            <a:rPr lang="en-US" sz="3000" u="sng" dirty="0">
                               <a:solidFill>
-                                <a:schemeClr val="tx1"/>
+                                <a:schemeClr val="bg1"/>
                               </a:solidFill>
                               <a:effectLst/>
                             </a:rPr>
                             <a:t>Subtraction</a:t>
                           </a:r>
-                          <a:endParaRPr lang="en-US" sz="3000">
+                          <a:endParaRPr lang="en-US" sz="3000" dirty="0">
                             <a:solidFill>
-                              <a:schemeClr val="tx1"/>
+                              <a:schemeClr val="bg1"/>
                             </a:solidFill>
                             <a:effectLst/>
                             <a:latin typeface="Times New Roman" panose="02020603050405020304" pitchFamily="18" charset="0"/>
@@ -6072,39 +6184,43 @@
                                 <m:d>
                                   <m:dPr>
                                     <m:ctrlPr>
-                                      <a:rPr lang="en-US" sz="3000" smtClean="0">
+                                      <a:rPr lang="en-US" sz="3000" i="1" baseline="0" smtClean="0">
                                         <a:solidFill>
                                           <a:schemeClr val="tx1"/>
                                         </a:solidFill>
                                         <a:effectLst/>
+                                        <a:latin typeface="Cambria Math" panose="02040503050406030204" pitchFamily="18" charset="0"/>
                                       </a:rPr>
                                     </m:ctrlPr>
                                   </m:dPr>
                                   <m:e>
                                     <m:r>
-                                      <a:rPr lang="en-US" sz="3000">
+                                      <a:rPr lang="en-US" sz="3000" baseline="0">
                                         <a:solidFill>
                                           <a:schemeClr val="tx1"/>
                                         </a:solidFill>
                                         <a:effectLst/>
+                                        <a:latin typeface="Cambria Math" panose="02040503050406030204" pitchFamily="18" charset="0"/>
                                       </a:rPr>
                                       <m:t>𝑓</m:t>
                                     </m:r>
                                     <m:r>
-                                      <a:rPr lang="en-US" sz="3000">
+                                      <a:rPr lang="en-US" sz="3000" baseline="0">
                                         <a:solidFill>
                                           <a:schemeClr val="tx1"/>
                                         </a:solidFill>
                                         <a:effectLst/>
+                                        <a:latin typeface="Cambria Math" panose="02040503050406030204" pitchFamily="18" charset="0"/>
                                       </a:rPr>
                                       <m:t>−</m:t>
                                     </m:r>
                                     <m:r>
-                                      <a:rPr lang="en-US" sz="3000">
+                                      <a:rPr lang="en-US" sz="3000" baseline="0">
                                         <a:solidFill>
                                           <a:schemeClr val="tx1"/>
                                         </a:solidFill>
                                         <a:effectLst/>
+                                        <a:latin typeface="Cambria Math" panose="02040503050406030204" pitchFamily="18" charset="0"/>
                                       </a:rPr>
                                       <m:t>𝑔</m:t>
                                     </m:r>
@@ -6113,111 +6229,122 @@
                                 <m:d>
                                   <m:dPr>
                                     <m:ctrlPr>
-                                      <a:rPr lang="en-US" sz="3000">
+                                      <a:rPr lang="en-US" sz="3000" i="1" baseline="0">
                                         <a:solidFill>
                                           <a:schemeClr val="tx1"/>
                                         </a:solidFill>
                                         <a:effectLst/>
+                                        <a:latin typeface="Cambria Math" panose="02040503050406030204" pitchFamily="18" charset="0"/>
                                       </a:rPr>
                                     </m:ctrlPr>
                                   </m:dPr>
                                   <m:e>
                                     <m:r>
-                                      <a:rPr lang="en-US" sz="3000">
+                                      <a:rPr lang="en-US" sz="3000" baseline="0">
                                         <a:solidFill>
                                           <a:schemeClr val="tx1"/>
                                         </a:solidFill>
                                         <a:effectLst/>
+                                        <a:latin typeface="Cambria Math" panose="02040503050406030204" pitchFamily="18" charset="0"/>
                                       </a:rPr>
                                       <m:t>𝑥</m:t>
                                     </m:r>
                                   </m:e>
                                 </m:d>
                                 <m:r>
-                                  <a:rPr lang="en-US" sz="3000">
+                                  <a:rPr lang="en-US" sz="3000" baseline="0">
                                     <a:solidFill>
                                       <a:schemeClr val="tx1"/>
                                     </a:solidFill>
                                     <a:effectLst/>
+                                    <a:latin typeface="Cambria Math" panose="02040503050406030204" pitchFamily="18" charset="0"/>
                                   </a:rPr>
                                   <m:t>= </m:t>
                                 </m:r>
                                 <m:r>
-                                  <a:rPr lang="en-US" sz="3000">
+                                  <a:rPr lang="en-US" sz="3000" baseline="0">
                                     <a:solidFill>
                                       <a:schemeClr val="tx1"/>
                                     </a:solidFill>
                                     <a:effectLst/>
+                                    <a:latin typeface="Cambria Math" panose="02040503050406030204" pitchFamily="18" charset="0"/>
                                   </a:rPr>
                                   <m:t>𝑓</m:t>
                                 </m:r>
                                 <m:r>
-                                  <a:rPr lang="en-US" sz="3000">
+                                  <a:rPr lang="en-US" sz="3000" baseline="0">
                                     <a:solidFill>
                                       <a:schemeClr val="tx1"/>
                                     </a:solidFill>
                                     <a:effectLst/>
+                                    <a:latin typeface="Cambria Math" panose="02040503050406030204" pitchFamily="18" charset="0"/>
                                   </a:rPr>
                                   <m:t>(</m:t>
                                 </m:r>
                                 <m:r>
-                                  <a:rPr lang="en-US" sz="3000">
+                                  <a:rPr lang="en-US" sz="3000" baseline="0">
                                     <a:solidFill>
                                       <a:schemeClr val="tx1"/>
                                     </a:solidFill>
                                     <a:effectLst/>
+                                    <a:latin typeface="Cambria Math" panose="02040503050406030204" pitchFamily="18" charset="0"/>
                                   </a:rPr>
                                   <m:t>𝑥</m:t>
                                 </m:r>
                                 <m:r>
-                                  <a:rPr lang="en-US" sz="3000">
+                                  <a:rPr lang="en-US" sz="3000" baseline="0">
                                     <a:solidFill>
                                       <a:schemeClr val="tx1"/>
                                     </a:solidFill>
                                     <a:effectLst/>
+                                    <a:latin typeface="Cambria Math" panose="02040503050406030204" pitchFamily="18" charset="0"/>
                                   </a:rPr>
                                   <m:t>) – </m:t>
                                 </m:r>
                                 <m:r>
-                                  <a:rPr lang="en-US" sz="3000">
+                                  <a:rPr lang="en-US" sz="3000" baseline="0">
                                     <a:solidFill>
                                       <a:schemeClr val="tx1"/>
                                     </a:solidFill>
                                     <a:effectLst/>
+                                    <a:latin typeface="Cambria Math" panose="02040503050406030204" pitchFamily="18" charset="0"/>
                                   </a:rPr>
                                   <m:t>𝑔</m:t>
                                 </m:r>
                                 <m:r>
-                                  <a:rPr lang="en-US" sz="3000">
+                                  <a:rPr lang="en-US" sz="3000" baseline="0">
                                     <a:solidFill>
                                       <a:schemeClr val="tx1"/>
                                     </a:solidFill>
                                     <a:effectLst/>
+                                    <a:latin typeface="Cambria Math" panose="02040503050406030204" pitchFamily="18" charset="0"/>
                                   </a:rPr>
                                   <m:t>(</m:t>
                                 </m:r>
                                 <m:r>
-                                  <a:rPr lang="en-US" sz="3000">
+                                  <a:rPr lang="en-US" sz="3000" baseline="0">
                                     <a:solidFill>
                                       <a:schemeClr val="tx1"/>
                                     </a:solidFill>
                                     <a:effectLst/>
+                                    <a:latin typeface="Cambria Math" panose="02040503050406030204" pitchFamily="18" charset="0"/>
                                   </a:rPr>
                                   <m:t>𝑥</m:t>
                                 </m:r>
                                 <m:r>
-                                  <a:rPr lang="en-US" sz="3000">
+                                  <a:rPr lang="en-US" sz="3000" baseline="0">
                                     <a:solidFill>
                                       <a:schemeClr val="tx1"/>
                                     </a:solidFill>
                                     <a:effectLst/>
+                                    <a:latin typeface="Cambria Math" panose="02040503050406030204" pitchFamily="18" charset="0"/>
                                   </a:rPr>
                                   <m:t>)</m:t>
                                 </m:r>
                               </m:oMath>
                             </m:oMathPara>
                           </a14:m>
-                          <a:endParaRPr lang="en-US" sz="3000" dirty="0">
+                          <a:endParaRPr lang="en-US" sz="3000" baseline="0" dirty="0">
                             <a:solidFill>
                               <a:schemeClr val="tx1"/>
                             </a:solidFill>
@@ -6248,7 +6375,9 @@
                           <a:r>
                             <a:rPr lang="en-US" sz="3000">
                               <a:solidFill>
-                                <a:schemeClr val="tx1"/>
+                                <a:schemeClr val="bg1">
+                                  <a:lumMod val="95000"/>
+                                </a:schemeClr>
                               </a:solidFill>
                               <a:effectLst/>
                             </a:rPr>
@@ -6256,7 +6385,9 @@
                           </a:r>
                           <a:endParaRPr lang="en-US" sz="3000">
                             <a:solidFill>
-                              <a:schemeClr val="tx1"/>
+                              <a:schemeClr val="bg1">
+                                <a:lumMod val="95000"/>
+                              </a:schemeClr>
                             </a:solidFill>
                             <a:effectLst/>
                             <a:latin typeface="Times New Roman" panose="02020603050405020304" pitchFamily="18" charset="0"/>
@@ -6285,17 +6416,17 @@
                             </a:spcAft>
                           </a:pPr>
                           <a:r>
-                            <a:rPr lang="en-US" sz="3000" u="sng">
+                            <a:rPr lang="en-US" sz="3000" u="sng" dirty="0">
                               <a:solidFill>
-                                <a:schemeClr val="tx1"/>
+                                <a:schemeClr val="bg1"/>
                               </a:solidFill>
                               <a:effectLst/>
                             </a:rPr>
                             <a:t>Multiplication</a:t>
                           </a:r>
-                          <a:endParaRPr lang="en-US" sz="3000">
+                          <a:endParaRPr lang="en-US" sz="3000" dirty="0">
                             <a:solidFill>
-                              <a:schemeClr val="tx1"/>
+                              <a:schemeClr val="bg1"/>
                             </a:solidFill>
                             <a:effectLst/>
                             <a:latin typeface="Times New Roman" panose="02020603050405020304" pitchFamily="18" charset="0"/>
@@ -6330,39 +6461,43 @@
                                 <m:d>
                                   <m:dPr>
                                     <m:ctrlPr>
-                                      <a:rPr lang="en-US" sz="3000" smtClean="0">
+                                      <a:rPr lang="en-US" sz="3000" i="1" baseline="0" smtClean="0">
                                         <a:solidFill>
                                           <a:schemeClr val="tx1"/>
                                         </a:solidFill>
                                         <a:effectLst/>
+                                        <a:latin typeface="Cambria Math" panose="02040503050406030204" pitchFamily="18" charset="0"/>
                                       </a:rPr>
                                     </m:ctrlPr>
                                   </m:dPr>
                                   <m:e>
                                     <m:r>
-                                      <a:rPr lang="en-US" sz="3000">
+                                      <a:rPr lang="en-US" sz="3000" baseline="0">
                                         <a:solidFill>
                                           <a:schemeClr val="tx1"/>
                                         </a:solidFill>
                                         <a:effectLst/>
+                                        <a:latin typeface="Cambria Math" panose="02040503050406030204" pitchFamily="18" charset="0"/>
                                       </a:rPr>
                                       <m:t>𝑓</m:t>
                                     </m:r>
                                     <m:r>
-                                      <a:rPr lang="en-US" sz="3000">
+                                      <a:rPr lang="en-US" sz="3000" baseline="0">
                                         <a:solidFill>
                                           <a:schemeClr val="tx1"/>
                                         </a:solidFill>
                                         <a:effectLst/>
+                                        <a:latin typeface="Cambria Math" panose="02040503050406030204" pitchFamily="18" charset="0"/>
                                       </a:rPr>
                                       <m:t>×</m:t>
                                     </m:r>
                                     <m:r>
-                                      <a:rPr lang="en-US" sz="3000">
+                                      <a:rPr lang="en-US" sz="3000" baseline="0">
                                         <a:solidFill>
                                           <a:schemeClr val="tx1"/>
                                         </a:solidFill>
                                         <a:effectLst/>
+                                        <a:latin typeface="Cambria Math" panose="02040503050406030204" pitchFamily="18" charset="0"/>
                                       </a:rPr>
                                       <m:t>𝑔</m:t>
                                     </m:r>
@@ -6371,116 +6506,127 @@
                                 <m:d>
                                   <m:dPr>
                                     <m:ctrlPr>
-                                      <a:rPr lang="en-US" sz="3000">
+                                      <a:rPr lang="en-US" sz="3000" i="1" baseline="0">
                                         <a:solidFill>
                                           <a:schemeClr val="tx1"/>
                                         </a:solidFill>
                                         <a:effectLst/>
+                                        <a:latin typeface="Cambria Math" panose="02040503050406030204" pitchFamily="18" charset="0"/>
                                       </a:rPr>
                                     </m:ctrlPr>
                                   </m:dPr>
                                   <m:e>
                                     <m:r>
-                                      <a:rPr lang="en-US" sz="3000">
+                                      <a:rPr lang="en-US" sz="3000" baseline="0">
                                         <a:solidFill>
                                           <a:schemeClr val="tx1"/>
                                         </a:solidFill>
                                         <a:effectLst/>
+                                        <a:latin typeface="Cambria Math" panose="02040503050406030204" pitchFamily="18" charset="0"/>
                                       </a:rPr>
                                       <m:t>𝑥</m:t>
                                     </m:r>
                                   </m:e>
                                 </m:d>
                                 <m:r>
-                                  <a:rPr lang="en-US" sz="3000">
+                                  <a:rPr lang="en-US" sz="3000" baseline="0">
                                     <a:solidFill>
                                       <a:schemeClr val="tx1"/>
                                     </a:solidFill>
                                     <a:effectLst/>
+                                    <a:latin typeface="Cambria Math" panose="02040503050406030204" pitchFamily="18" charset="0"/>
                                   </a:rPr>
                                   <m:t>= </m:t>
                                 </m:r>
                                 <m:r>
-                                  <a:rPr lang="en-US" sz="3000">
+                                  <a:rPr lang="en-US" sz="3000" baseline="0">
                                     <a:solidFill>
                                       <a:schemeClr val="tx1"/>
                                     </a:solidFill>
                                     <a:effectLst/>
+                                    <a:latin typeface="Cambria Math" panose="02040503050406030204" pitchFamily="18" charset="0"/>
                                   </a:rPr>
                                   <m:t>𝑓</m:t>
                                 </m:r>
                                 <m:d>
                                   <m:dPr>
                                     <m:ctrlPr>
-                                      <a:rPr lang="en-US" sz="3000">
+                                      <a:rPr lang="en-US" sz="3000" i="1" baseline="0">
                                         <a:solidFill>
                                           <a:schemeClr val="tx1"/>
                                         </a:solidFill>
                                         <a:effectLst/>
+                                        <a:latin typeface="Cambria Math" panose="02040503050406030204" pitchFamily="18" charset="0"/>
                                       </a:rPr>
                                     </m:ctrlPr>
                                   </m:dPr>
                                   <m:e>
                                     <m:r>
-                                      <a:rPr lang="en-US" sz="3000">
+                                      <a:rPr lang="en-US" sz="3000" baseline="0">
                                         <a:solidFill>
                                           <a:schemeClr val="tx1"/>
                                         </a:solidFill>
                                         <a:effectLst/>
+                                        <a:latin typeface="Cambria Math" panose="02040503050406030204" pitchFamily="18" charset="0"/>
                                       </a:rPr>
                                       <m:t>𝑥</m:t>
                                     </m:r>
                                   </m:e>
                                 </m:d>
                                 <m:r>
-                                  <a:rPr lang="en-US" sz="3000">
+                                  <a:rPr lang="en-US" sz="3000" baseline="0">
                                     <a:solidFill>
                                       <a:schemeClr val="tx1"/>
                                     </a:solidFill>
                                     <a:effectLst/>
+                                    <a:latin typeface="Cambria Math" panose="02040503050406030204" pitchFamily="18" charset="0"/>
                                   </a:rPr>
                                   <m:t>× </m:t>
                                 </m:r>
                                 <m:r>
-                                  <a:rPr lang="en-US" sz="3000">
+                                  <a:rPr lang="en-US" sz="3000" baseline="0">
                                     <a:solidFill>
                                       <a:schemeClr val="tx1"/>
                                     </a:solidFill>
                                     <a:effectLst/>
+                                    <a:latin typeface="Cambria Math" panose="02040503050406030204" pitchFamily="18" charset="0"/>
                                   </a:rPr>
                                   <m:t>𝑔</m:t>
                                 </m:r>
                                 <m:r>
-                                  <a:rPr lang="en-US" sz="3000">
+                                  <a:rPr lang="en-US" sz="3000" baseline="0">
                                     <a:solidFill>
                                       <a:schemeClr val="tx1"/>
                                     </a:solidFill>
                                     <a:effectLst/>
+                                    <a:latin typeface="Cambria Math" panose="02040503050406030204" pitchFamily="18" charset="0"/>
                                   </a:rPr>
                                   <m:t>(</m:t>
                                 </m:r>
                                 <m:r>
-                                  <a:rPr lang="en-US" sz="3000">
+                                  <a:rPr lang="en-US" sz="3000" baseline="0">
                                     <a:solidFill>
                                       <a:schemeClr val="tx1"/>
                                     </a:solidFill>
                                     <a:effectLst/>
+                                    <a:latin typeface="Cambria Math" panose="02040503050406030204" pitchFamily="18" charset="0"/>
                                   </a:rPr>
                                   <m:t>𝑥</m:t>
                                 </m:r>
                                 <m:r>
-                                  <a:rPr lang="en-US" sz="3000">
+                                  <a:rPr lang="en-US" sz="3000" baseline="0">
                                     <a:solidFill>
                                       <a:schemeClr val="tx1"/>
                                     </a:solidFill>
                                     <a:effectLst/>
+                                    <a:latin typeface="Cambria Math" panose="02040503050406030204" pitchFamily="18" charset="0"/>
                                   </a:rPr>
                                   <m:t>)</m:t>
                                 </m:r>
                               </m:oMath>
                             </m:oMathPara>
                           </a14:m>
-                          <a:endParaRPr lang="en-US" sz="3000" dirty="0">
+                          <a:endParaRPr lang="en-US" sz="3000" baseline="0" dirty="0">
                             <a:solidFill>
                               <a:schemeClr val="tx1"/>
                             </a:solidFill>
@@ -6511,7 +6657,9 @@
                           <a:r>
                             <a:rPr lang="en-US" sz="3000" dirty="0">
                               <a:solidFill>
-                                <a:schemeClr val="tx1"/>
+                                <a:schemeClr val="bg1">
+                                  <a:lumMod val="95000"/>
+                                </a:schemeClr>
                               </a:solidFill>
                               <a:effectLst/>
                             </a:rPr>
@@ -6520,7 +6668,9 @@
                           <a:r>
                             <a:rPr lang="en-US" sz="3000" baseline="30000" dirty="0">
                               <a:solidFill>
-                                <a:schemeClr val="tx1"/>
+                                <a:schemeClr val="bg1">
+                                  <a:lumMod val="95000"/>
+                                </a:schemeClr>
                               </a:solidFill>
                               <a:effectLst/>
                             </a:rPr>
@@ -6529,7 +6679,9 @@
                           <a:r>
                             <a:rPr lang="en-US" sz="3000" dirty="0">
                               <a:solidFill>
-                                <a:schemeClr val="tx1"/>
+                                <a:schemeClr val="bg1">
+                                  <a:lumMod val="95000"/>
+                                </a:schemeClr>
                               </a:solidFill>
                               <a:effectLst/>
                             </a:rPr>
@@ -6537,7 +6689,9 @@
                           </a:r>
                           <a:endParaRPr lang="en-US" sz="3000" dirty="0">
                             <a:solidFill>
-                              <a:schemeClr val="tx1"/>
+                              <a:schemeClr val="bg1">
+                                <a:lumMod val="95000"/>
+                              </a:schemeClr>
                             </a:solidFill>
                             <a:effectLst/>
                             <a:latin typeface="Times New Roman" panose="02020603050405020304" pitchFamily="18" charset="0"/>
@@ -6566,17 +6720,17 @@
                             </a:spcAft>
                           </a:pPr>
                           <a:r>
-                            <a:rPr lang="en-US" sz="3000" u="sng">
+                            <a:rPr lang="en-US" sz="3000" u="sng" dirty="0">
                               <a:solidFill>
-                                <a:schemeClr val="tx1"/>
+                                <a:schemeClr val="bg1"/>
                               </a:solidFill>
                               <a:effectLst/>
                             </a:rPr>
                             <a:t>Division</a:t>
                           </a:r>
-                          <a:endParaRPr lang="en-US" sz="3000">
+                          <a:endParaRPr lang="en-US" sz="3000" dirty="0">
                             <a:solidFill>
-                              <a:schemeClr val="tx1"/>
+                              <a:schemeClr val="bg1"/>
                             </a:solidFill>
                             <a:effectLst/>
                             <a:latin typeface="Times New Roman" panose="02020603050405020304" pitchFamily="18" charset="0"/>
@@ -6607,11 +6761,12 @@
                               <m:d>
                                 <m:dPr>
                                   <m:ctrlPr>
-                                    <a:rPr lang="en-US" sz="3000" smtClean="0">
+                                    <a:rPr lang="en-US" sz="3000" i="1" smtClean="0">
                                       <a:solidFill>
-                                        <a:schemeClr val="tx1"/>
+                                        <a:schemeClr val="bg1"/>
                                       </a:solidFill>
                                       <a:effectLst/>
+                                      <a:latin typeface="Cambria Math" panose="02040503050406030204" pitchFamily="18" charset="0"/>
                                     </a:rPr>
                                   </m:ctrlPr>
                                 </m:dPr>
@@ -6619,11 +6774,12 @@
                                   <m:f>
                                     <m:fPr>
                                       <m:ctrlPr>
-                                        <a:rPr lang="en-US" sz="3000">
+                                        <a:rPr lang="en-US" sz="3000" i="1">
                                           <a:solidFill>
-                                            <a:schemeClr val="tx1"/>
+                                            <a:schemeClr val="bg1"/>
                                           </a:solidFill>
                                           <a:effectLst/>
+                                          <a:latin typeface="Cambria Math" panose="02040503050406030204" pitchFamily="18" charset="0"/>
                                         </a:rPr>
                                       </m:ctrlPr>
                                     </m:fPr>
@@ -6631,9 +6787,10 @@
                                       <m:r>
                                         <a:rPr lang="en-US" sz="3000">
                                           <a:solidFill>
-                                            <a:schemeClr val="tx1"/>
+                                            <a:schemeClr val="bg1"/>
                                           </a:solidFill>
                                           <a:effectLst/>
+                                          <a:latin typeface="Cambria Math" panose="02040503050406030204" pitchFamily="18" charset="0"/>
                                         </a:rPr>
                                         <m:t>𝑓</m:t>
                                       </m:r>
@@ -6642,9 +6799,10 @@
                                       <m:r>
                                         <a:rPr lang="en-US" sz="3000">
                                           <a:solidFill>
-                                            <a:schemeClr val="tx1"/>
+                                            <a:schemeClr val="bg1"/>
                                           </a:solidFill>
                                           <a:effectLst/>
+                                          <a:latin typeface="Cambria Math" panose="02040503050406030204" pitchFamily="18" charset="0"/>
                                         </a:rPr>
                                         <m:t>𝑔</m:t>
                                       </m:r>
@@ -6655,11 +6813,12 @@
                               <m:d>
                                 <m:dPr>
                                   <m:ctrlPr>
-                                    <a:rPr lang="en-US" sz="3000">
+                                    <a:rPr lang="en-US" sz="3000" i="1">
                                       <a:solidFill>
-                                        <a:schemeClr val="tx1"/>
+                                        <a:schemeClr val="bg1"/>
                                       </a:solidFill>
                                       <a:effectLst/>
+                                      <a:latin typeface="Cambria Math" panose="02040503050406030204" pitchFamily="18" charset="0"/>
                                     </a:rPr>
                                   </m:ctrlPr>
                                 </m:dPr>
@@ -6667,9 +6826,10 @@
                                   <m:r>
                                     <a:rPr lang="en-US" sz="3000">
                                       <a:solidFill>
-                                        <a:schemeClr val="tx1"/>
+                                        <a:schemeClr val="bg1"/>
                                       </a:solidFill>
                                       <a:effectLst/>
+                                      <a:latin typeface="Cambria Math" panose="02040503050406030204" pitchFamily="18" charset="0"/>
                                     </a:rPr>
                                     <m:t>𝑥</m:t>
                                   </m:r>
@@ -6678,20 +6838,22 @@
                               <m:r>
                                 <a:rPr lang="en-US" sz="3000">
                                   <a:solidFill>
-                                    <a:schemeClr val="tx1"/>
+                                    <a:schemeClr val="bg1"/>
                                   </a:solidFill>
                                   <a:effectLst/>
+                                  <a:latin typeface="Cambria Math" panose="02040503050406030204" pitchFamily="18" charset="0"/>
                                 </a:rPr>
                                 <m:t>=</m:t>
                               </m:r>
                               <m:f>
                                 <m:fPr>
                                   <m:ctrlPr>
-                                    <a:rPr lang="en-US" sz="3000">
+                                    <a:rPr lang="en-US" sz="3000" i="1">
                                       <a:solidFill>
-                                        <a:schemeClr val="tx1"/>
+                                        <a:schemeClr val="bg1"/>
                                       </a:solidFill>
                                       <a:effectLst/>
+                                      <a:latin typeface="Cambria Math" panose="02040503050406030204" pitchFamily="18" charset="0"/>
                                     </a:rPr>
                                   </m:ctrlPr>
                                 </m:fPr>
@@ -6699,36 +6861,40 @@
                                   <m:r>
                                     <a:rPr lang="en-US" sz="3000">
                                       <a:solidFill>
-                                        <a:schemeClr val="tx1"/>
+                                        <a:schemeClr val="bg1"/>
                                       </a:solidFill>
                                       <a:effectLst/>
+                                      <a:latin typeface="Cambria Math" panose="02040503050406030204" pitchFamily="18" charset="0"/>
                                     </a:rPr>
                                     <m:t>𝑓</m:t>
                                   </m:r>
                                   <m:r>
                                     <a:rPr lang="en-US" sz="3000">
                                       <a:solidFill>
-                                        <a:schemeClr val="tx1"/>
+                                        <a:schemeClr val="bg1"/>
                                       </a:solidFill>
                                       <a:effectLst/>
+                                      <a:latin typeface="Cambria Math" panose="02040503050406030204" pitchFamily="18" charset="0"/>
                                     </a:rPr>
                                     <m:t>(</m:t>
                                   </m:r>
                                   <m:r>
                                     <a:rPr lang="en-US" sz="3000">
                                       <a:solidFill>
-                                        <a:schemeClr val="tx1"/>
+                                        <a:schemeClr val="bg1"/>
                                       </a:solidFill>
                                       <a:effectLst/>
+                                      <a:latin typeface="Cambria Math" panose="02040503050406030204" pitchFamily="18" charset="0"/>
                                     </a:rPr>
                                     <m:t>𝑥</m:t>
                                   </m:r>
                                   <m:r>
                                     <a:rPr lang="en-US" sz="3000">
                                       <a:solidFill>
-                                        <a:schemeClr val="tx1"/>
+                                        <a:schemeClr val="bg1"/>
                                       </a:solidFill>
                                       <a:effectLst/>
+                                      <a:latin typeface="Cambria Math" panose="02040503050406030204" pitchFamily="18" charset="0"/>
                                     </a:rPr>
                                     <m:t>)</m:t>
                                   </m:r>
@@ -6737,36 +6903,40 @@
                                   <m:r>
                                     <a:rPr lang="en-US" sz="3000">
                                       <a:solidFill>
-                                        <a:schemeClr val="tx1"/>
+                                        <a:schemeClr val="bg1"/>
                                       </a:solidFill>
                                       <a:effectLst/>
+                                      <a:latin typeface="Cambria Math" panose="02040503050406030204" pitchFamily="18" charset="0"/>
                                     </a:rPr>
                                     <m:t>𝑔</m:t>
                                   </m:r>
                                   <m:r>
                                     <a:rPr lang="en-US" sz="3000">
                                       <a:solidFill>
-                                        <a:schemeClr val="tx1"/>
+                                        <a:schemeClr val="bg1"/>
                                       </a:solidFill>
                                       <a:effectLst/>
+                                      <a:latin typeface="Cambria Math" panose="02040503050406030204" pitchFamily="18" charset="0"/>
                                     </a:rPr>
                                     <m:t>(</m:t>
                                   </m:r>
                                   <m:r>
                                     <a:rPr lang="en-US" sz="3000">
                                       <a:solidFill>
-                                        <a:schemeClr val="tx1"/>
+                                        <a:schemeClr val="bg1"/>
                                       </a:solidFill>
                                       <a:effectLst/>
+                                      <a:latin typeface="Cambria Math" panose="02040503050406030204" pitchFamily="18" charset="0"/>
                                     </a:rPr>
                                     <m:t>𝑥</m:t>
                                   </m:r>
                                   <m:r>
                                     <a:rPr lang="en-US" sz="3000">
                                       <a:solidFill>
-                                        <a:schemeClr val="tx1"/>
+                                        <a:schemeClr val="bg1"/>
                                       </a:solidFill>
                                       <a:effectLst/>
+                                      <a:latin typeface="Cambria Math" panose="02040503050406030204" pitchFamily="18" charset="0"/>
                                     </a:rPr>
                                     <m:t>)</m:t>
                                   </m:r>
@@ -6777,7 +6947,7 @@
                           <a:r>
                             <a:rPr lang="en-US" sz="3000" dirty="0">
                               <a:solidFill>
-                                <a:schemeClr val="tx1"/>
+                                <a:schemeClr val="bg1"/>
                               </a:solidFill>
                               <a:effectLst/>
                             </a:rPr>
@@ -6788,9 +6958,10 @@
                               <m:r>
                                 <a:rPr lang="en-US" sz="3000">
                                   <a:solidFill>
-                                    <a:schemeClr val="tx1"/>
+                                    <a:schemeClr val="bg1"/>
                                   </a:solidFill>
                                   <a:effectLst/>
+                                  <a:latin typeface="Cambria Math" panose="02040503050406030204" pitchFamily="18" charset="0"/>
                                 </a:rPr>
                                 <m:t>≠0</m:t>
                               </m:r>
@@ -6798,7 +6969,7 @@
                           </a14:m>
                           <a:endParaRPr lang="en-US" sz="3000" dirty="0">
                             <a:solidFill>
-                              <a:schemeClr val="tx1"/>
+                              <a:schemeClr val="bg1"/>
                             </a:solidFill>
                             <a:effectLst/>
                             <a:latin typeface="Times New Roman" panose="02020603050405020304" pitchFamily="18" charset="0"/>
@@ -6827,7 +6998,9 @@
                           <a:r>
                             <a:rPr lang="en-US" sz="3000" dirty="0" smtClean="0">
                               <a:solidFill>
-                                <a:schemeClr val="tx1"/>
+                                <a:schemeClr val="bg1">
+                                  <a:lumMod val="95000"/>
+                                </a:schemeClr>
                               </a:solidFill>
                               <a:effectLst/>
                               <a:latin typeface="Times New Roman" panose="02020603050405020304" pitchFamily="18" charset="0"/>
@@ -6837,7 +7010,9 @@
                           </a:r>
                           <a:endParaRPr lang="en-US" sz="3000" dirty="0">
                             <a:solidFill>
-                              <a:schemeClr val="tx1"/>
+                              <a:schemeClr val="bg1">
+                                <a:lumMod val="95000"/>
+                              </a:schemeClr>
                             </a:solidFill>
                             <a:effectLst/>
                             <a:latin typeface="Times New Roman" panose="02020603050405020304" pitchFamily="18" charset="0"/>
@@ -6864,7 +7039,7 @@
                 <p:ph idx="1"/>
                 <p:extLst>
                   <p:ext uri="{D42A27DB-BD31-4B8C-83A1-F6EECF244321}">
-                    <p14:modId xmlns:p14="http://schemas.microsoft.com/office/powerpoint/2010/main" val="3025471891"/>
+                    <p14:modId xmlns:p14="http://schemas.microsoft.com/office/powerpoint/2010/main" val="4114596936"/>
                   </p:ext>
                 </p:extLst>
               </p:nvPr>
@@ -6904,7 +7079,7 @@
                           <a:r>
                             <a:rPr lang="en-US" sz="3000" dirty="0">
                               <a:solidFill>
-                                <a:schemeClr val="tx1"/>
+                                <a:schemeClr val="bg1"/>
                               </a:solidFill>
                               <a:effectLst/>
                             </a:rPr>
@@ -6912,44 +7087,7 @@
                           </a:r>
                           <a:endParaRPr lang="en-US" sz="3000" dirty="0">
                             <a:solidFill>
-                              <a:schemeClr val="tx1"/>
-                            </a:solidFill>
-                            <a:effectLst/>
-                            <a:latin typeface="Times New Roman" panose="02020603050405020304" pitchFamily="18" charset="0"/>
-                            <a:ea typeface="Times New Roman" panose="02020603050405020304" pitchFamily="18" charset="0"/>
-                          </a:endParaRPr>
-                        </a:p>
-                      </a:txBody>
-                      <a:tcPr marL="68580" marR="68580" marT="0" marB="0"/>
-                    </a:tc>
-                    <a:tc>
-                      <a:txBody>
-                        <a:bodyPr/>
-                        <a:lstStyle/>
-                        <a:p>
-                          <a:pPr marL="0" marR="0">
-                            <a:lnSpc>
-                              <a:spcPct val="115000"/>
-                            </a:lnSpc>
-                            <a:spcBef>
-                              <a:spcPts val="0"/>
-                            </a:spcBef>
-                            <a:spcAft>
-                              <a:spcPts val="0"/>
-                            </a:spcAft>
-                          </a:pPr>
-                          <a:r>
-                            <a:rPr lang="en-US" sz="3000">
-                              <a:solidFill>
-                                <a:schemeClr val="tx1"/>
-                              </a:solidFill>
-                              <a:effectLst/>
-                            </a:rPr>
-                            <a:t>Definition</a:t>
-                          </a:r>
-                          <a:endParaRPr lang="en-US" sz="3000">
-                            <a:solidFill>
-                              <a:schemeClr val="tx1"/>
+                              <a:schemeClr val="bg1"/>
                             </a:solidFill>
                             <a:effectLst/>
                             <a:latin typeface="Times New Roman" panose="02020603050405020304" pitchFamily="18" charset="0"/>
@@ -6978,7 +7116,46 @@
                           <a:r>
                             <a:rPr lang="en-US" sz="3000" dirty="0">
                               <a:solidFill>
-                                <a:schemeClr val="tx1"/>
+                                <a:schemeClr val="bg1"/>
+                              </a:solidFill>
+                              <a:effectLst/>
+                            </a:rPr>
+                            <a:t>Definition</a:t>
+                          </a:r>
+                          <a:endParaRPr lang="en-US" sz="3000" dirty="0">
+                            <a:solidFill>
+                              <a:schemeClr val="bg1"/>
+                            </a:solidFill>
+                            <a:effectLst/>
+                            <a:latin typeface="Times New Roman" panose="02020603050405020304" pitchFamily="18" charset="0"/>
+                            <a:ea typeface="Times New Roman" panose="02020603050405020304" pitchFamily="18" charset="0"/>
+                          </a:endParaRPr>
+                        </a:p>
+                      </a:txBody>
+                      <a:tcPr marL="68580" marR="68580" marT="0" marB="0"/>
+                    </a:tc>
+                    <a:tc>
+                      <a:txBody>
+                        <a:bodyPr/>
+                        <a:lstStyle/>
+                        <a:p>
+                          <a:pPr marL="0" marR="0">
+                            <a:lnSpc>
+                              <a:spcPct val="115000"/>
+                            </a:lnSpc>
+                            <a:spcBef>
+                              <a:spcPts val="0"/>
+                            </a:spcBef>
+                            <a:spcAft>
+                              <a:spcPts val="0"/>
+                            </a:spcAft>
+                          </a:pPr>
+                          <a:r>
+                            <a:rPr lang="en-US" sz="3000" dirty="0">
+                              <a:solidFill>
+                                <a:schemeClr val="bg1">
+                                  <a:lumMod val="95000"/>
+                                </a:schemeClr>
                               </a:solidFill>
                               <a:effectLst/>
                             </a:rPr>
@@ -6986,7 +7163,9 @@
                           </a:r>
                           <a:endParaRPr lang="en-US" sz="3000" dirty="0" smtClean="0">
                             <a:solidFill>
-                              <a:schemeClr val="tx1"/>
+                              <a:schemeClr val="bg1">
+                                <a:lumMod val="95000"/>
+                              </a:schemeClr>
                             </a:solidFill>
                             <a:effectLst/>
                           </a:endParaRPr>
@@ -7006,7 +7185,9 @@
                           <a:r>
                             <a:rPr lang="en-US" sz="3000" dirty="0" smtClean="0">
                               <a:solidFill>
-                                <a:schemeClr val="tx1"/>
+                                <a:schemeClr val="bg1">
+                                  <a:lumMod val="95000"/>
+                                </a:schemeClr>
                               </a:solidFill>
                               <a:effectLst/>
                             </a:rPr>
@@ -7015,7 +7196,9 @@
                           <a:r>
                             <a:rPr lang="en-US" sz="3000" dirty="0">
                               <a:solidFill>
-                                <a:schemeClr val="tx1"/>
+                                <a:schemeClr val="bg1">
+                                  <a:lumMod val="95000"/>
+                                </a:schemeClr>
                               </a:solidFill>
                               <a:effectLst/>
                             </a:rPr>
@@ -7023,7 +7206,9 @@
                           </a:r>
                           <a:endParaRPr lang="en-US" sz="3000" dirty="0">
                             <a:solidFill>
-                              <a:schemeClr val="tx1"/>
+                              <a:schemeClr val="bg1">
+                                <a:lumMod val="95000"/>
+                              </a:schemeClr>
                             </a:solidFill>
                             <a:effectLst/>
                             <a:latin typeface="Times New Roman" panose="02020603050405020304" pitchFamily="18" charset="0"/>
@@ -7054,7 +7239,7 @@
                           <a:r>
                             <a:rPr lang="en-US" sz="3000" u="sng" dirty="0">
                               <a:solidFill>
-                                <a:schemeClr val="tx1"/>
+                                <a:schemeClr val="bg1"/>
                               </a:solidFill>
                               <a:effectLst/>
                             </a:rPr>
@@ -7062,7 +7247,7 @@
                           </a:r>
                           <a:endParaRPr lang="en-US" sz="3000" dirty="0">
                             <a:solidFill>
-                              <a:schemeClr val="tx1"/>
+                              <a:schemeClr val="bg1"/>
                             </a:solidFill>
                             <a:effectLst/>
                             <a:latin typeface="Times New Roman" panose="02020603050405020304" pitchFamily="18" charset="0"/>
@@ -7108,7 +7293,9 @@
                           <a:r>
                             <a:rPr lang="en-US" sz="3000">
                               <a:solidFill>
-                                <a:schemeClr val="tx1"/>
+                                <a:schemeClr val="bg1">
+                                  <a:lumMod val="95000"/>
+                                </a:schemeClr>
                               </a:solidFill>
                               <a:effectLst/>
                             </a:rPr>
@@ -7116,7 +7303,9 @@
                           </a:r>
                           <a:endParaRPr lang="en-US" sz="3000">
                             <a:solidFill>
-                              <a:schemeClr val="tx1"/>
+                              <a:schemeClr val="bg1">
+                                <a:lumMod val="95000"/>
+                              </a:schemeClr>
                             </a:solidFill>
                             <a:effectLst/>
                             <a:latin typeface="Times New Roman" panose="02020603050405020304" pitchFamily="18" charset="0"/>
@@ -7145,17 +7334,17 @@
                             </a:spcAft>
                           </a:pPr>
                           <a:r>
-                            <a:rPr lang="en-US" sz="3000" u="sng">
+                            <a:rPr lang="en-US" sz="3000" u="sng" dirty="0">
                               <a:solidFill>
-                                <a:schemeClr val="tx1"/>
+                                <a:schemeClr val="bg1"/>
                               </a:solidFill>
                               <a:effectLst/>
                             </a:rPr>
                             <a:t>Subtraction</a:t>
                           </a:r>
-                          <a:endParaRPr lang="en-US" sz="3000">
+                          <a:endParaRPr lang="en-US" sz="3000" dirty="0">
                             <a:solidFill>
-                              <a:schemeClr val="tx1"/>
+                              <a:schemeClr val="bg1"/>
                             </a:solidFill>
                             <a:effectLst/>
                             <a:latin typeface="Times New Roman" panose="02020603050405020304" pitchFamily="18" charset="0"/>
@@ -7201,7 +7390,9 @@
                           <a:r>
                             <a:rPr lang="en-US" sz="3000">
                               <a:solidFill>
-                                <a:schemeClr val="tx1"/>
+                                <a:schemeClr val="bg1">
+                                  <a:lumMod val="95000"/>
+                                </a:schemeClr>
                               </a:solidFill>
                               <a:effectLst/>
                             </a:rPr>
@@ -7209,7 +7400,9 @@
                           </a:r>
                           <a:endParaRPr lang="en-US" sz="3000">
                             <a:solidFill>
-                              <a:schemeClr val="tx1"/>
+                              <a:schemeClr val="bg1">
+                                <a:lumMod val="95000"/>
+                              </a:schemeClr>
                             </a:solidFill>
                             <a:effectLst/>
                             <a:latin typeface="Times New Roman" panose="02020603050405020304" pitchFamily="18" charset="0"/>
@@ -7238,17 +7431,17 @@
                             </a:spcAft>
                           </a:pPr>
                           <a:r>
-                            <a:rPr lang="en-US" sz="3000" u="sng">
+                            <a:rPr lang="en-US" sz="3000" u="sng" dirty="0">
                               <a:solidFill>
-                                <a:schemeClr val="tx1"/>
+                                <a:schemeClr val="bg1"/>
                               </a:solidFill>
                               <a:effectLst/>
                             </a:rPr>
                             <a:t>Multiplication</a:t>
                           </a:r>
-                          <a:endParaRPr lang="en-US" sz="3000">
+                          <a:endParaRPr lang="en-US" sz="3000" dirty="0">
                             <a:solidFill>
-                              <a:schemeClr val="tx1"/>
+                              <a:schemeClr val="bg1"/>
                             </a:solidFill>
                             <a:effectLst/>
                             <a:latin typeface="Times New Roman" panose="02020603050405020304" pitchFamily="18" charset="0"/>
@@ -7294,7 +7487,9 @@
                           <a:r>
                             <a:rPr lang="en-US" sz="3000" dirty="0">
                               <a:solidFill>
-                                <a:schemeClr val="tx1"/>
+                                <a:schemeClr val="bg1">
+                                  <a:lumMod val="95000"/>
+                                </a:schemeClr>
                               </a:solidFill>
                               <a:effectLst/>
                             </a:rPr>
@@ -7303,7 +7498,9 @@
                           <a:r>
                             <a:rPr lang="en-US" sz="3000" baseline="30000" dirty="0">
                               <a:solidFill>
-                                <a:schemeClr val="tx1"/>
+                                <a:schemeClr val="bg1">
+                                  <a:lumMod val="95000"/>
+                                </a:schemeClr>
                               </a:solidFill>
                               <a:effectLst/>
                             </a:rPr>
@@ -7312,7 +7509,9 @@
                           <a:r>
                             <a:rPr lang="en-US" sz="3000" dirty="0">
                               <a:solidFill>
-                                <a:schemeClr val="tx1"/>
+                                <a:schemeClr val="bg1">
+                                  <a:lumMod val="95000"/>
+                                </a:schemeClr>
                               </a:solidFill>
                               <a:effectLst/>
                             </a:rPr>
@@ -7320,7 +7519,9 @@
                           </a:r>
                           <a:endParaRPr lang="en-US" sz="3000" dirty="0">
                             <a:solidFill>
-                              <a:schemeClr val="tx1"/>
+                              <a:schemeClr val="bg1">
+                                <a:lumMod val="95000"/>
+                              </a:schemeClr>
                             </a:solidFill>
                             <a:effectLst/>
                             <a:latin typeface="Times New Roman" panose="02020603050405020304" pitchFamily="18" charset="0"/>
@@ -7349,17 +7550,17 @@
                             </a:spcAft>
                           </a:pPr>
                           <a:r>
-                            <a:rPr lang="en-US" sz="3000" u="sng">
+                            <a:rPr lang="en-US" sz="3000" u="sng" dirty="0">
                               <a:solidFill>
-                                <a:schemeClr val="tx1"/>
+                                <a:schemeClr val="bg1"/>
                               </a:solidFill>
                               <a:effectLst/>
                             </a:rPr>
                             <a:t>Division</a:t>
                           </a:r>
-                          <a:endParaRPr lang="en-US" sz="3000">
+                          <a:endParaRPr lang="en-US" sz="3000" dirty="0">
                             <a:solidFill>
-                              <a:schemeClr val="tx1"/>
+                              <a:schemeClr val="bg1"/>
                             </a:solidFill>
                             <a:effectLst/>
                             <a:latin typeface="Times New Roman" panose="02020603050405020304" pitchFamily="18" charset="0"/>
@@ -7405,7 +7606,9 @@
                           <a:r>
                             <a:rPr lang="en-US" sz="3000" dirty="0" smtClean="0">
                               <a:solidFill>
-                                <a:schemeClr val="tx1"/>
+                                <a:schemeClr val="bg1">
+                                  <a:lumMod val="95000"/>
+                                </a:schemeClr>
                               </a:solidFill>
                               <a:effectLst/>
                               <a:latin typeface="Times New Roman" panose="02020603050405020304" pitchFamily="18" charset="0"/>
@@ -7415,7 +7618,9 @@
                           </a:r>
                           <a:endParaRPr lang="en-US" sz="3000" dirty="0">
                             <a:solidFill>
-                              <a:schemeClr val="tx1"/>
+                              <a:schemeClr val="bg1">
+                                <a:lumMod val="95000"/>
+                              </a:schemeClr>
                             </a:solidFill>
                             <a:effectLst/>
                             <a:latin typeface="Times New Roman" panose="02020603050405020304" pitchFamily="18" charset="0"/>
@@ -7442,6 +7647,13 @@
   <p:clrMapOvr>
     <a:masterClrMapping/>
   </p:clrMapOvr>
+  <p:timing>
+    <p:tnLst>
+      <p:par>
+        <p:cTn id="1" dur="indefinite" restart="never" nodeType="tmRoot"/>
+      </p:par>
+    </p:tnLst>
+  </p:timing>
 </p:sld>
 </file>
 
@@ -7557,6 +7769,13 @@
   <p:clrMapOvr>
     <a:masterClrMapping/>
   </p:clrMapOvr>
+  <p:timing>
+    <p:tnLst>
+      <p:par>
+        <p:cTn id="1" dur="indefinite" restart="never" nodeType="tmRoot"/>
+      </p:par>
+    </p:tnLst>
+  </p:timing>
 </p:sld>
 </file>
 
@@ -7710,6 +7929,13 @@
   <p:clrMapOvr>
     <a:masterClrMapping/>
   </p:clrMapOvr>
+  <p:timing>
+    <p:tnLst>
+      <p:par>
+        <p:cTn id="1" dur="indefinite" restart="never" nodeType="tmRoot"/>
+      </p:par>
+    </p:tnLst>
+  </p:timing>
 </p:sld>
 </file>
 
@@ -7956,6 +8182,13 @@
   <p:clrMapOvr>
     <a:masterClrMapping/>
   </p:clrMapOvr>
+  <p:timing>
+    <p:tnLst>
+      <p:par>
+        <p:cTn id="1" dur="indefinite" restart="never" nodeType="tmRoot"/>
+      </p:par>
+    </p:tnLst>
+  </p:timing>
 </p:sld>
 </file>
 
@@ -8002,8 +8235,8 @@
           </a:p>
         </p:txBody>
       </p:sp>
-      <mc:AlternateContent xmlns:mc="http://schemas.openxmlformats.org/markup-compatibility/2006">
-        <mc:Choice xmlns:a14="http://schemas.microsoft.com/office/drawing/2010/main" Requires="a14">
+      <mc:AlternateContent xmlns:mc="http://schemas.openxmlformats.org/markup-compatibility/2006" xmlns:a14="http://schemas.microsoft.com/office/drawing/2010/main">
+        <mc:Choice Requires="a14">
           <p:sp>
             <p:nvSpPr>
               <p:cNvPr id="3" name="Content Placeholder 2"/>
@@ -8030,31 +8263,45 @@
                 <a14:m>
                   <m:oMath xmlns:m="http://schemas.openxmlformats.org/officeDocument/2006/math">
                     <m:r>
-                      <a:rPr lang="en-US" sz="3200" b="1" i="1"/>
+                      <a:rPr lang="en-US" sz="3200" b="1" i="1">
+                        <a:latin typeface="Cambria Math" panose="02040503050406030204" pitchFamily="18" charset="0"/>
+                      </a:rPr>
                       <m:t>(</m:t>
                     </m:r>
                     <m:r>
-                      <a:rPr lang="en-US" sz="3200" b="1" i="1"/>
+                      <a:rPr lang="en-US" sz="3200" b="1" i="1">
+                        <a:latin typeface="Cambria Math" panose="02040503050406030204" pitchFamily="18" charset="0"/>
+                      </a:rPr>
                       <m:t>𝒇</m:t>
                     </m:r>
                     <m:r>
-                      <a:rPr lang="en-US" sz="3200" b="1" i="1"/>
+                      <a:rPr lang="en-US" sz="3200" b="1" i="1">
+                        <a:latin typeface="Cambria Math" panose="02040503050406030204" pitchFamily="18" charset="0"/>
+                      </a:rPr>
                       <m:t>°</m:t>
                     </m:r>
                     <m:r>
-                      <a:rPr lang="en-US" sz="3200" b="1" i="1"/>
+                      <a:rPr lang="en-US" sz="3200" b="1" i="1">
+                        <a:latin typeface="Cambria Math" panose="02040503050406030204" pitchFamily="18" charset="0"/>
+                      </a:rPr>
                       <m:t>𝒈</m:t>
                     </m:r>
                     <m:r>
-                      <a:rPr lang="en-US" sz="3200" b="1" i="1"/>
+                      <a:rPr lang="en-US" sz="3200" b="1" i="1">
+                        <a:latin typeface="Cambria Math" panose="02040503050406030204" pitchFamily="18" charset="0"/>
+                      </a:rPr>
                       <m:t>)(</m:t>
                     </m:r>
                     <m:r>
-                      <a:rPr lang="en-US" sz="3200" b="1" i="1"/>
+                      <a:rPr lang="en-US" sz="3200" b="1" i="1">
+                        <a:latin typeface="Cambria Math" panose="02040503050406030204" pitchFamily="18" charset="0"/>
+                      </a:rPr>
                       <m:t>𝒙</m:t>
                     </m:r>
                     <m:r>
-                      <a:rPr lang="en-US" sz="3200" b="1" i="1"/>
+                      <a:rPr lang="en-US" sz="3200" b="1" i="1">
+                        <a:latin typeface="Cambria Math" panose="02040503050406030204" pitchFamily="18" charset="0"/>
+                      </a:rPr>
                       <m:t>)</m:t>
                     </m:r>
                   </m:oMath>
@@ -8074,34 +8321,48 @@
                     <m:d>
                       <m:dPr>
                         <m:ctrlPr>
-                          <a:rPr lang="en-US" sz="3200" b="1" i="1"/>
+                          <a:rPr lang="en-US" sz="3200" b="1" i="1">
+                            <a:latin typeface="Cambria Math" panose="02040503050406030204" pitchFamily="18" charset="0"/>
+                          </a:rPr>
                         </m:ctrlPr>
                       </m:dPr>
                       <m:e>
                         <m:r>
-                          <a:rPr lang="en-US" sz="3200" b="1" i="1"/>
+                          <a:rPr lang="en-US" sz="3200" b="1" i="1">
+                            <a:latin typeface="Cambria Math" panose="02040503050406030204" pitchFamily="18" charset="0"/>
+                          </a:rPr>
                           <m:t>𝒈</m:t>
                         </m:r>
                         <m:r>
-                          <a:rPr lang="en-US" sz="3200" b="1" i="1"/>
+                          <a:rPr lang="en-US" sz="3200" b="1" i="1">
+                            <a:latin typeface="Cambria Math" panose="02040503050406030204" pitchFamily="18" charset="0"/>
+                          </a:rPr>
                           <m:t>°</m:t>
                         </m:r>
                         <m:r>
-                          <a:rPr lang="en-US" sz="3200" b="1" i="1"/>
+                          <a:rPr lang="en-US" sz="3200" b="1" i="1">
+                            <a:latin typeface="Cambria Math" panose="02040503050406030204" pitchFamily="18" charset="0"/>
+                          </a:rPr>
                           <m:t>𝒇</m:t>
                         </m:r>
                       </m:e>
                     </m:d>
                     <m:r>
-                      <a:rPr lang="en-US" sz="3200" b="1" i="1"/>
+                      <a:rPr lang="en-US" sz="3200" b="1" i="1">
+                        <a:latin typeface="Cambria Math" panose="02040503050406030204" pitchFamily="18" charset="0"/>
+                      </a:rPr>
                       <m:t>(</m:t>
                     </m:r>
                     <m:r>
-                      <a:rPr lang="en-US" sz="3200" b="1" i="1"/>
+                      <a:rPr lang="en-US" sz="3200" b="1" i="1">
+                        <a:latin typeface="Cambria Math" panose="02040503050406030204" pitchFamily="18" charset="0"/>
+                      </a:rPr>
                       <m:t>𝒙</m:t>
                     </m:r>
                     <m:r>
-                      <a:rPr lang="en-US" sz="3200" b="1" i="1"/>
+                      <a:rPr lang="en-US" sz="3200" b="1" i="1">
+                        <a:latin typeface="Cambria Math" panose="02040503050406030204" pitchFamily="18" charset="0"/>
+                      </a:rPr>
                       <m:t>)</m:t>
                     </m:r>
                   </m:oMath>
@@ -8121,34 +8382,48 @@
                     <m:d>
                       <m:dPr>
                         <m:ctrlPr>
-                          <a:rPr lang="en-US" sz="3200" b="1" i="1"/>
+                          <a:rPr lang="en-US" sz="3200" b="1" i="1">
+                            <a:latin typeface="Cambria Math" panose="02040503050406030204" pitchFamily="18" charset="0"/>
+                          </a:rPr>
                         </m:ctrlPr>
                       </m:dPr>
                       <m:e>
                         <m:r>
-                          <a:rPr lang="en-US" sz="3200" b="1" i="1"/>
+                          <a:rPr lang="en-US" sz="3200" b="1" i="1">
+                            <a:latin typeface="Cambria Math" panose="02040503050406030204" pitchFamily="18" charset="0"/>
+                          </a:rPr>
                           <m:t>𝒇</m:t>
                         </m:r>
                         <m:r>
-                          <a:rPr lang="en-US" sz="3200" b="1" i="1"/>
+                          <a:rPr lang="en-US" sz="3200" b="1" i="1">
+                            <a:latin typeface="Cambria Math" panose="02040503050406030204" pitchFamily="18" charset="0"/>
+                          </a:rPr>
                           <m:t>°</m:t>
                         </m:r>
                         <m:r>
-                          <a:rPr lang="en-US" sz="3200" b="1" i="1"/>
+                          <a:rPr lang="en-US" sz="3200" b="1" i="1">
+                            <a:latin typeface="Cambria Math" panose="02040503050406030204" pitchFamily="18" charset="0"/>
+                          </a:rPr>
                           <m:t>𝒇</m:t>
                         </m:r>
                       </m:e>
                     </m:d>
                     <m:r>
-                      <a:rPr lang="en-US" sz="3200" b="1" i="1"/>
+                      <a:rPr lang="en-US" sz="3200" b="1" i="1">
+                        <a:latin typeface="Cambria Math" panose="02040503050406030204" pitchFamily="18" charset="0"/>
+                      </a:rPr>
                       <m:t>(</m:t>
                     </m:r>
                     <m:r>
-                      <a:rPr lang="en-US" sz="3200" b="1" i="1"/>
+                      <a:rPr lang="en-US" sz="3200" b="1" i="1">
+                        <a:latin typeface="Cambria Math" panose="02040503050406030204" pitchFamily="18" charset="0"/>
+                      </a:rPr>
                       <m:t>𝒙</m:t>
                     </m:r>
                     <m:r>
-                      <a:rPr lang="en-US" sz="3200" b="1" i="1"/>
+                      <a:rPr lang="en-US" sz="3200" b="1" i="1">
+                        <a:latin typeface="Cambria Math" panose="02040503050406030204" pitchFamily="18" charset="0"/>
+                      </a:rPr>
                       <m:t>)</m:t>
                     </m:r>
                   </m:oMath>
@@ -8168,34 +8443,48 @@
                     <m:d>
                       <m:dPr>
                         <m:ctrlPr>
-                          <a:rPr lang="en-US" sz="3200" b="1" i="1"/>
+                          <a:rPr lang="en-US" sz="3200" b="1" i="1">
+                            <a:latin typeface="Cambria Math" panose="02040503050406030204" pitchFamily="18" charset="0"/>
+                          </a:rPr>
                         </m:ctrlPr>
                       </m:dPr>
                       <m:e>
                         <m:r>
-                          <a:rPr lang="en-US" sz="3200" b="1" i="1"/>
+                          <a:rPr lang="en-US" sz="3200" b="1" i="1">
+                            <a:latin typeface="Cambria Math" panose="02040503050406030204" pitchFamily="18" charset="0"/>
+                          </a:rPr>
                           <m:t>𝒈</m:t>
                         </m:r>
                         <m:r>
-                          <a:rPr lang="en-US" sz="3200" b="1" i="1"/>
+                          <a:rPr lang="en-US" sz="3200" b="1" i="1">
+                            <a:latin typeface="Cambria Math" panose="02040503050406030204" pitchFamily="18" charset="0"/>
+                          </a:rPr>
                           <m:t>°</m:t>
                         </m:r>
                         <m:r>
-                          <a:rPr lang="en-US" sz="3200" b="1" i="1"/>
+                          <a:rPr lang="en-US" sz="3200" b="1" i="1">
+                            <a:latin typeface="Cambria Math" panose="02040503050406030204" pitchFamily="18" charset="0"/>
+                          </a:rPr>
                           <m:t>𝒈</m:t>
                         </m:r>
                       </m:e>
                     </m:d>
                     <m:r>
-                      <a:rPr lang="en-US" sz="3200" b="1" i="1"/>
+                      <a:rPr lang="en-US" sz="3200" b="1" i="1">
+                        <a:latin typeface="Cambria Math" panose="02040503050406030204" pitchFamily="18" charset="0"/>
+                      </a:rPr>
                       <m:t>(</m:t>
                     </m:r>
                     <m:r>
-                      <a:rPr lang="en-US" sz="3200" b="1" i="1"/>
+                      <a:rPr lang="en-US" sz="3200" b="1" i="1">
+                        <a:latin typeface="Cambria Math" panose="02040503050406030204" pitchFamily="18" charset="0"/>
+                      </a:rPr>
                       <m:t>𝒙</m:t>
                     </m:r>
                     <m:r>
-                      <a:rPr lang="en-US" sz="3200" b="1" i="1"/>
+                      <a:rPr lang="en-US" sz="3200" b="1" i="1">
+                        <a:latin typeface="Cambria Math" panose="02040503050406030204" pitchFamily="18" charset="0"/>
+                      </a:rPr>
                       <m:t>)</m:t>
                     </m:r>
                   </m:oMath>
@@ -8215,7 +8504,7 @@
             </p:txBody>
           </p:sp>
         </mc:Choice>
-        <mc:Fallback>
+        <mc:Fallback xmlns="">
           <p:sp>
             <p:nvSpPr>
               <p:cNvPr id="3" name="Content Placeholder 2"/>
@@ -8335,6 +8624,13 @@
   <p:clrMapOvr>
     <a:masterClrMapping/>
   </p:clrMapOvr>
+  <p:timing>
+    <p:tnLst>
+      <p:par>
+        <p:cTn id="1" dur="indefinite" restart="never" nodeType="tmRoot"/>
+      </p:par>
+    </p:tnLst>
+  </p:timing>
 </p:sld>
 </file>
 
@@ -8473,6 +8769,13 @@
   <p:clrMapOvr>
     <a:masterClrMapping/>
   </p:clrMapOvr>
+  <p:timing>
+    <p:tnLst>
+      <p:par>
+        <p:cTn id="1" dur="indefinite" restart="never" nodeType="tmRoot"/>
+      </p:par>
+    </p:tnLst>
+  </p:timing>
 </p:sld>
 </file>
 

</xml_diff>